<commit_message>
Add callbacked to pptx
</commit_message>
<xml_diff>
--- a/JavaScript Master Course for Beginners.pptx
+++ b/JavaScript Master Course for Beginners.pptx
@@ -63,6 +63,9 @@
     <p:sldId id="314" r:id="rId57"/>
     <p:sldId id="315" r:id="rId58"/>
     <p:sldId id="316" r:id="rId59"/>
+    <p:sldId id="317" r:id="rId60"/>
+    <p:sldId id="318" r:id="rId61"/>
+    <p:sldId id="319" r:id="rId62"/>
   </p:sldIdLst>
   <p:sldSz cx="12192000" cy="6858000"/>
   <p:notesSz cx="6858000" cy="9144000"/>
@@ -14653,6 +14656,105 @@
 </p:sld>
 </file>
 
+<file path=ppt/slides/slide59.xml><?xml version="1.0" encoding="utf-8"?>
+<p:sld xmlns:a="http://schemas.openxmlformats.org/drawingml/2006/main" xmlns:r="http://schemas.openxmlformats.org/officeDocument/2006/relationships" xmlns:p="http://schemas.openxmlformats.org/presentationml/2006/main">
+  <p:cSld>
+    <p:spTree>
+      <p:nvGrpSpPr>
+        <p:cNvPr id="1" name=""/>
+        <p:cNvGrpSpPr/>
+        <p:nvPr/>
+      </p:nvGrpSpPr>
+      <p:grpSpPr>
+        <a:xfrm>
+          <a:off x="0" y="0"/>
+          <a:ext cx="0" cy="0"/>
+          <a:chOff x="0" y="0"/>
+          <a:chExt cx="0" cy="0"/>
+        </a:xfrm>
+      </p:grpSpPr>
+      <p:sp>
+        <p:nvSpPr>
+          <p:cNvPr id="2" name="Title 1">
+            <a:extLst>
+              <a:ext uri="{FF2B5EF4-FFF2-40B4-BE49-F238E27FC236}">
+                <a16:creationId xmlns:a16="http://schemas.microsoft.com/office/drawing/2014/main" id="{3C21A636-F767-FE4A-5D1C-A01C896D1E21}"/>
+              </a:ext>
+            </a:extLst>
+          </p:cNvPr>
+          <p:cNvSpPr>
+            <a:spLocks noGrp="1"/>
+          </p:cNvSpPr>
+          <p:nvPr>
+            <p:ph type="title"/>
+          </p:nvPr>
+        </p:nvSpPr>
+        <p:spPr>
+          <a:xfrm>
+            <a:off x="838200" y="365126"/>
+            <a:ext cx="10515600" cy="788426"/>
+          </a:xfrm>
+        </p:spPr>
+        <p:txBody>
+          <a:bodyPr>
+            <a:normAutofit/>
+          </a:bodyPr>
+          <a:lstStyle/>
+          <a:p>
+            <a:r>
+              <a:rPr lang="en-US" b="1" dirty="0"/>
+              <a:t>Callback Functions in JavaScript</a:t>
+            </a:r>
+            <a:endParaRPr lang="en-US" dirty="0"/>
+          </a:p>
+        </p:txBody>
+      </p:sp>
+      <p:sp>
+        <p:nvSpPr>
+          <p:cNvPr id="3" name="Content Placeholder 2">
+            <a:extLst>
+              <a:ext uri="{FF2B5EF4-FFF2-40B4-BE49-F238E27FC236}">
+                <a16:creationId xmlns:a16="http://schemas.microsoft.com/office/drawing/2014/main" id="{05190223-50F2-A14A-D981-50AC0D4AF88D}"/>
+              </a:ext>
+            </a:extLst>
+          </p:cNvPr>
+          <p:cNvSpPr>
+            <a:spLocks noGrp="1"/>
+          </p:cNvSpPr>
+          <p:nvPr>
+            <p:ph idx="1"/>
+          </p:nvPr>
+        </p:nvSpPr>
+        <p:spPr>
+          <a:xfrm>
+            <a:off x="838200" y="1153552"/>
+            <a:ext cx="10515600" cy="5023411"/>
+          </a:xfrm>
+        </p:spPr>
+        <p:txBody>
+          <a:bodyPr/>
+          <a:lstStyle/>
+          <a:p>
+            <a:r>
+              <a:rPr lang="en-US" dirty="0"/>
+              <a:t>In JavaScript, a callback function is a function that is passed as an argument to another function and is executed after some operation or event has occurred. Callbacks are commonly used in asynchronous programming to handle tasks that take time to complete, such as fetching data from a server, reading files, or responding to user interactions.</a:t>
+            </a:r>
+          </a:p>
+        </p:txBody>
+      </p:sp>
+    </p:spTree>
+    <p:extLst>
+      <p:ext uri="{BB962C8B-B14F-4D97-AF65-F5344CB8AC3E}">
+        <p14:creationId xmlns:p14="http://schemas.microsoft.com/office/powerpoint/2010/main" val="1946424944"/>
+      </p:ext>
+    </p:extLst>
+  </p:cSld>
+  <p:clrMapOvr>
+    <a:masterClrMapping/>
+  </p:clrMapOvr>
+</p:sld>
+</file>
+
 <file path=ppt/slides/slide6.xml><?xml version="1.0" encoding="utf-8"?>
 <p:sld xmlns:a="http://schemas.openxmlformats.org/drawingml/2006/main" xmlns:r="http://schemas.openxmlformats.org/officeDocument/2006/relationships" xmlns:p="http://schemas.openxmlformats.org/presentationml/2006/main">
   <p:cSld>
@@ -14750,6 +14852,400 @@
     <p:extLst>
       <p:ext uri="{BB962C8B-B14F-4D97-AF65-F5344CB8AC3E}">
         <p14:creationId xmlns:p14="http://schemas.microsoft.com/office/powerpoint/2010/main" val="3811872271"/>
+      </p:ext>
+    </p:extLst>
+  </p:cSld>
+  <p:clrMapOvr>
+    <a:masterClrMapping/>
+  </p:clrMapOvr>
+</p:sld>
+</file>
+
+<file path=ppt/slides/slide60.xml><?xml version="1.0" encoding="utf-8"?>
+<p:sld xmlns:a="http://schemas.openxmlformats.org/drawingml/2006/main" xmlns:r="http://schemas.openxmlformats.org/officeDocument/2006/relationships" xmlns:p="http://schemas.openxmlformats.org/presentationml/2006/main">
+  <p:cSld>
+    <p:spTree>
+      <p:nvGrpSpPr>
+        <p:cNvPr id="1" name="">
+          <a:extLst>
+            <a:ext uri="{FF2B5EF4-FFF2-40B4-BE49-F238E27FC236}">
+              <a16:creationId xmlns:a16="http://schemas.microsoft.com/office/drawing/2014/main" id="{19A1559A-BE94-9F88-7DDC-038C1BBF68DF}"/>
+            </a:ext>
+          </a:extLst>
+        </p:cNvPr>
+        <p:cNvGrpSpPr/>
+        <p:nvPr/>
+      </p:nvGrpSpPr>
+      <p:grpSpPr>
+        <a:xfrm>
+          <a:off x="0" y="0"/>
+          <a:ext cx="0" cy="0"/>
+          <a:chOff x="0" y="0"/>
+          <a:chExt cx="0" cy="0"/>
+        </a:xfrm>
+      </p:grpSpPr>
+      <p:sp>
+        <p:nvSpPr>
+          <p:cNvPr id="2" name="Title 1">
+            <a:extLst>
+              <a:ext uri="{FF2B5EF4-FFF2-40B4-BE49-F238E27FC236}">
+                <a16:creationId xmlns:a16="http://schemas.microsoft.com/office/drawing/2014/main" id="{3A211FD7-B16D-DC77-B96C-E58CA491A376}"/>
+              </a:ext>
+            </a:extLst>
+          </p:cNvPr>
+          <p:cNvSpPr>
+            <a:spLocks noGrp="1"/>
+          </p:cNvSpPr>
+          <p:nvPr>
+            <p:ph type="title"/>
+          </p:nvPr>
+        </p:nvSpPr>
+        <p:spPr>
+          <a:xfrm>
+            <a:off x="838200" y="365126"/>
+            <a:ext cx="10515600" cy="788426"/>
+          </a:xfrm>
+        </p:spPr>
+        <p:txBody>
+          <a:bodyPr>
+            <a:normAutofit/>
+          </a:bodyPr>
+          <a:lstStyle/>
+          <a:p>
+            <a:r>
+              <a:rPr lang="en-US" b="1" dirty="0"/>
+              <a:t>Example of a Callback Function:</a:t>
+            </a:r>
+            <a:endParaRPr lang="en-US" dirty="0"/>
+          </a:p>
+        </p:txBody>
+      </p:sp>
+      <p:sp>
+        <p:nvSpPr>
+          <p:cNvPr id="3" name="Content Placeholder 2">
+            <a:extLst>
+              <a:ext uri="{FF2B5EF4-FFF2-40B4-BE49-F238E27FC236}">
+                <a16:creationId xmlns:a16="http://schemas.microsoft.com/office/drawing/2014/main" id="{DF034F33-A606-54F4-30EF-7A8DD6F253E6}"/>
+              </a:ext>
+            </a:extLst>
+          </p:cNvPr>
+          <p:cNvSpPr>
+            <a:spLocks noGrp="1"/>
+          </p:cNvSpPr>
+          <p:nvPr>
+            <p:ph idx="1"/>
+          </p:nvPr>
+        </p:nvSpPr>
+        <p:spPr>
+          <a:xfrm>
+            <a:off x="838200" y="1153552"/>
+            <a:ext cx="10515600" cy="5458263"/>
+          </a:xfrm>
+        </p:spPr>
+        <p:txBody>
+          <a:bodyPr>
+            <a:normAutofit fontScale="92500" lnSpcReduction="10000"/>
+          </a:bodyPr>
+          <a:lstStyle/>
+          <a:p>
+            <a:pPr marL="0" indent="0">
+              <a:buNone/>
+            </a:pPr>
+            <a:r>
+              <a:rPr lang="en-US" dirty="0"/>
+              <a:t>// Function that takes a callback as an argument and invokes it</a:t>
+            </a:r>
+          </a:p>
+          <a:p>
+            <a:pPr marL="0" indent="0">
+              <a:buNone/>
+            </a:pPr>
+            <a:r>
+              <a:rPr lang="en-US" dirty="0"/>
+              <a:t>function </a:t>
+            </a:r>
+            <a:r>
+              <a:rPr lang="en-US" dirty="0" err="1"/>
+              <a:t>doSomethingAsync</a:t>
+            </a:r>
+            <a:r>
+              <a:rPr lang="en-US" dirty="0"/>
+              <a:t>(callback) {</a:t>
+            </a:r>
+          </a:p>
+          <a:p>
+            <a:pPr marL="0" indent="0">
+              <a:buNone/>
+            </a:pPr>
+            <a:r>
+              <a:rPr lang="en-US" dirty="0"/>
+              <a:t>  </a:t>
+            </a:r>
+            <a:r>
+              <a:rPr lang="en-US" dirty="0" err="1"/>
+              <a:t>setTimeout</a:t>
+            </a:r>
+            <a:r>
+              <a:rPr lang="en-US" dirty="0"/>
+              <a:t>(() =&gt; {</a:t>
+            </a:r>
+          </a:p>
+          <a:p>
+            <a:pPr marL="0" indent="0">
+              <a:buNone/>
+            </a:pPr>
+            <a:r>
+              <a:rPr lang="en-US" dirty="0"/>
+              <a:t>    // Simulate an asynchronous operation</a:t>
+            </a:r>
+          </a:p>
+          <a:p>
+            <a:pPr marL="0" indent="0">
+              <a:buNone/>
+            </a:pPr>
+            <a:r>
+              <a:rPr lang="en-US" dirty="0"/>
+              <a:t>    const result = 'Data retrieved successfully’;</a:t>
+            </a:r>
+          </a:p>
+          <a:p>
+            <a:pPr marL="0" indent="0">
+              <a:buNone/>
+            </a:pPr>
+            <a:r>
+              <a:rPr lang="en-US" dirty="0"/>
+              <a:t>    callback(result);</a:t>
+            </a:r>
+          </a:p>
+          <a:p>
+            <a:pPr marL="0" indent="0">
+              <a:buNone/>
+            </a:pPr>
+            <a:r>
+              <a:rPr lang="en-US" dirty="0"/>
+              <a:t>  }, 2000); // Simulate a delay of 2 seconds</a:t>
+            </a:r>
+          </a:p>
+          <a:p>
+            <a:pPr marL="0" indent="0">
+              <a:buNone/>
+            </a:pPr>
+            <a:r>
+              <a:rPr lang="en-US" dirty="0"/>
+              <a:t>}// Callback function to handle the result</a:t>
+            </a:r>
+          </a:p>
+          <a:p>
+            <a:pPr marL="0" indent="0">
+              <a:buNone/>
+            </a:pPr>
+            <a:r>
+              <a:rPr lang="en-US" dirty="0"/>
+              <a:t>function </a:t>
+            </a:r>
+            <a:r>
+              <a:rPr lang="en-US" dirty="0" err="1"/>
+              <a:t>handleResult</a:t>
+            </a:r>
+            <a:r>
+              <a:rPr lang="en-US" dirty="0"/>
+              <a:t>(result) {</a:t>
+            </a:r>
+          </a:p>
+          <a:p>
+            <a:pPr marL="0" indent="0">
+              <a:buNone/>
+            </a:pPr>
+            <a:r>
+              <a:rPr lang="en-US" dirty="0"/>
+              <a:t>  console.log(result);</a:t>
+            </a:r>
+          </a:p>
+          <a:p>
+            <a:pPr marL="0" indent="0">
+              <a:buNone/>
+            </a:pPr>
+            <a:r>
+              <a:rPr lang="en-US" dirty="0"/>
+              <a:t>}// Using the function with a callback</a:t>
+            </a:r>
+          </a:p>
+          <a:p>
+            <a:pPr marL="0" indent="0">
+              <a:buNone/>
+            </a:pPr>
+            <a:r>
+              <a:rPr lang="en-US" dirty="0" err="1"/>
+              <a:t>doSomethingAsync</a:t>
+            </a:r>
+            <a:r>
+              <a:rPr lang="en-US" dirty="0"/>
+              <a:t>(</a:t>
+            </a:r>
+            <a:r>
+              <a:rPr lang="en-US" dirty="0" err="1"/>
+              <a:t>handleResult</a:t>
+            </a:r>
+            <a:r>
+              <a:rPr lang="en-US" dirty="0"/>
+              <a:t>);</a:t>
+            </a:r>
+          </a:p>
+        </p:txBody>
+      </p:sp>
+    </p:spTree>
+    <p:extLst>
+      <p:ext uri="{BB962C8B-B14F-4D97-AF65-F5344CB8AC3E}">
+        <p14:creationId xmlns:p14="http://schemas.microsoft.com/office/powerpoint/2010/main" val="611103527"/>
+      </p:ext>
+    </p:extLst>
+  </p:cSld>
+  <p:clrMapOvr>
+    <a:masterClrMapping/>
+  </p:clrMapOvr>
+</p:sld>
+</file>
+
+<file path=ppt/slides/slide61.xml><?xml version="1.0" encoding="utf-8"?>
+<p:sld xmlns:a="http://schemas.openxmlformats.org/drawingml/2006/main" xmlns:r="http://schemas.openxmlformats.org/officeDocument/2006/relationships" xmlns:p="http://schemas.openxmlformats.org/presentationml/2006/main">
+  <p:cSld>
+    <p:spTree>
+      <p:nvGrpSpPr>
+        <p:cNvPr id="1" name="">
+          <a:extLst>
+            <a:ext uri="{FF2B5EF4-FFF2-40B4-BE49-F238E27FC236}">
+              <a16:creationId xmlns:a16="http://schemas.microsoft.com/office/drawing/2014/main" id="{35A8656D-B395-C53C-D62A-5B03FFDC7D57}"/>
+            </a:ext>
+          </a:extLst>
+        </p:cNvPr>
+        <p:cNvGrpSpPr/>
+        <p:nvPr/>
+      </p:nvGrpSpPr>
+      <p:grpSpPr>
+        <a:xfrm>
+          <a:off x="0" y="0"/>
+          <a:ext cx="0" cy="0"/>
+          <a:chOff x="0" y="0"/>
+          <a:chExt cx="0" cy="0"/>
+        </a:xfrm>
+      </p:grpSpPr>
+      <p:sp>
+        <p:nvSpPr>
+          <p:cNvPr id="2" name="Title 1">
+            <a:extLst>
+              <a:ext uri="{FF2B5EF4-FFF2-40B4-BE49-F238E27FC236}">
+                <a16:creationId xmlns:a16="http://schemas.microsoft.com/office/drawing/2014/main" id="{52421FFA-F185-55B0-6DEC-8CAA3BA501D0}"/>
+              </a:ext>
+            </a:extLst>
+          </p:cNvPr>
+          <p:cNvSpPr>
+            <a:spLocks noGrp="1"/>
+          </p:cNvSpPr>
+          <p:nvPr>
+            <p:ph type="title"/>
+          </p:nvPr>
+        </p:nvSpPr>
+        <p:spPr>
+          <a:xfrm>
+            <a:off x="838200" y="365126"/>
+            <a:ext cx="10515600" cy="788426"/>
+          </a:xfrm>
+        </p:spPr>
+        <p:txBody>
+          <a:bodyPr>
+            <a:normAutofit/>
+          </a:bodyPr>
+          <a:lstStyle/>
+          <a:p>
+            <a:r>
+              <a:rPr lang="en-US" b="1" dirty="0"/>
+              <a:t>Benefits of Callbacks:</a:t>
+            </a:r>
+          </a:p>
+        </p:txBody>
+      </p:sp>
+      <p:sp>
+        <p:nvSpPr>
+          <p:cNvPr id="3" name="Content Placeholder 2">
+            <a:extLst>
+              <a:ext uri="{FF2B5EF4-FFF2-40B4-BE49-F238E27FC236}">
+                <a16:creationId xmlns:a16="http://schemas.microsoft.com/office/drawing/2014/main" id="{52B50434-8997-AA08-3149-DF7F2B8F5E26}"/>
+              </a:ext>
+            </a:extLst>
+          </p:cNvPr>
+          <p:cNvSpPr>
+            <a:spLocks noGrp="1"/>
+          </p:cNvSpPr>
+          <p:nvPr>
+            <p:ph idx="1"/>
+          </p:nvPr>
+        </p:nvSpPr>
+        <p:spPr>
+          <a:xfrm>
+            <a:off x="838200" y="1153552"/>
+            <a:ext cx="10515600" cy="5458263"/>
+          </a:xfrm>
+        </p:spPr>
+        <p:txBody>
+          <a:bodyPr>
+            <a:normAutofit/>
+          </a:bodyPr>
+          <a:lstStyle/>
+          <a:p>
+            <a:pPr>
+              <a:buFont typeface="+mj-lt"/>
+              <a:buAutoNum type="arabicPeriod"/>
+            </a:pPr>
+            <a:endParaRPr lang="en-US" b="1" dirty="0"/>
+          </a:p>
+          <a:p>
+            <a:pPr>
+              <a:buFont typeface="+mj-lt"/>
+              <a:buAutoNum type="arabicPeriod"/>
+            </a:pPr>
+            <a:r>
+              <a:rPr lang="en-US" b="1" dirty="0"/>
+              <a:t>Asynchronous Programming:</a:t>
+            </a:r>
+            <a:r>
+              <a:rPr lang="en-US" dirty="0"/>
+              <a:t> Callbacks enable asynchronous programming in JavaScript, allowing operations to continue while waiting for asynchronous tasks to complete.</a:t>
+            </a:r>
+          </a:p>
+          <a:p>
+            <a:pPr>
+              <a:buFont typeface="+mj-lt"/>
+              <a:buAutoNum type="arabicPeriod"/>
+            </a:pPr>
+            <a:r>
+              <a:rPr lang="en-US" b="1" dirty="0"/>
+              <a:t>Flexibility:</a:t>
+            </a:r>
+            <a:r>
+              <a:rPr lang="en-US" dirty="0"/>
+              <a:t> Callbacks provide a flexible way to define behavior that should occur after an operation or event has completed. This makes it easy to customize functionality based on different scenarios.</a:t>
+            </a:r>
+          </a:p>
+          <a:p>
+            <a:pPr>
+              <a:buFont typeface="+mj-lt"/>
+              <a:buAutoNum type="arabicPeriod"/>
+            </a:pPr>
+            <a:r>
+              <a:rPr lang="en-US" b="1" dirty="0"/>
+              <a:t>Modularity:</a:t>
+            </a:r>
+            <a:r>
+              <a:rPr lang="en-US" dirty="0"/>
+              <a:t> Callbacks promote modularity by allowing you to separate concerns and encapsulate functionality within individual functions.</a:t>
+            </a:r>
+          </a:p>
+        </p:txBody>
+      </p:sp>
+    </p:spTree>
+    <p:extLst>
+      <p:ext uri="{BB962C8B-B14F-4D97-AF65-F5344CB8AC3E}">
+        <p14:creationId xmlns:p14="http://schemas.microsoft.com/office/powerpoint/2010/main" val="175403629"/>
       </p:ext>
     </p:extLst>
   </p:cSld>

</xml_diff>

<commit_message>
OOP and CallBack done
</commit_message>
<xml_diff>
--- a/JavaScript Master Course for Beginners.pptx
+++ b/JavaScript Master Course for Beginners.pptx
@@ -13395,7 +13395,12 @@
             <p:ph type="title"/>
           </p:nvPr>
         </p:nvSpPr>
-        <p:spPr/>
+        <p:spPr>
+          <a:xfrm>
+            <a:off x="838200" y="246185"/>
+            <a:ext cx="10515600" cy="1071710"/>
+          </a:xfrm>
+        </p:spPr>
         <p:txBody>
           <a:bodyPr/>
           <a:lstStyle/>
@@ -13429,13 +13434,13 @@
         </p:nvSpPr>
         <p:spPr>
           <a:xfrm>
-            <a:off x="838200" y="1913207"/>
-            <a:ext cx="10515600" cy="3770142"/>
+            <a:off x="838200" y="1317896"/>
+            <a:ext cx="10515600" cy="5293920"/>
           </a:xfrm>
         </p:spPr>
         <p:txBody>
           <a:bodyPr>
-            <a:normAutofit/>
+            <a:normAutofit fontScale="92500" lnSpcReduction="10000"/>
           </a:bodyPr>
           <a:lstStyle/>
           <a:p>
@@ -13461,6 +13466,36 @@
               <a:rPr lang="en-US" dirty="0"/>
               <a:t>A class in JavaScript is a blueprint for creating objects. It serves as a template for defining the structure and behavior of objects. It encapsulates data (properties) and methods (functions) that operate on that data.</a:t>
             </a:r>
+          </a:p>
+          <a:p>
+            <a:pPr marL="0" indent="0">
+              <a:buNone/>
+            </a:pPr>
+            <a:endParaRPr lang="en-US" dirty="0"/>
+          </a:p>
+          <a:p>
+            <a:r>
+              <a:rPr lang="en-US" dirty="0"/>
+              <a:t>Classes were introduced in ECMAScript 2015 (ES6).</a:t>
+            </a:r>
+          </a:p>
+          <a:p>
+            <a:r>
+              <a:rPr lang="en-US" dirty="0"/>
+              <a:t>Before ES6, JavaScript used prototype-based inheritance rather than classical inheritance found in languages like Java or C++. Prototypal inheritance can be less intuitive and verbose for those coming from classical inheritance backgrounds.</a:t>
+            </a:r>
+          </a:p>
+          <a:p>
+            <a:r>
+              <a:rPr lang="en-US" dirty="0"/>
+              <a:t>Classes in ES6 provide a more familiar syntax for defining object-oriented programming (OOP) constructs like constructors, methods, and inheritance, similar to other object-oriented programming languages.</a:t>
+            </a:r>
+          </a:p>
+          <a:p>
+            <a:pPr marL="0" indent="0">
+              <a:buNone/>
+            </a:pPr>
+            <a:endParaRPr lang="en-US" dirty="0"/>
           </a:p>
         </p:txBody>
       </p:sp>
@@ -14433,7 +14468,7 @@
         </p:spPr>
         <p:txBody>
           <a:bodyPr>
-            <a:normAutofit fontScale="92500" lnSpcReduction="10000"/>
+            <a:normAutofit/>
           </a:bodyPr>
           <a:lstStyle/>
           <a:p>
@@ -14450,32 +14485,6 @@
               <a:buNone/>
             </a:pPr>
             <a:endParaRPr lang="en-US" dirty="0"/>
-          </a:p>
-          <a:p>
-            <a:r>
-              <a:rPr lang="en-US" dirty="0"/>
-              <a:t>C</a:t>
-            </a:r>
-            <a:r>
-              <a:rPr lang="en-US"/>
-              <a:t>lasses </a:t>
-            </a:r>
-            <a:r>
-              <a:rPr lang="en-US" dirty="0"/>
-              <a:t>were introduced in ECMAScript 2015 (ES6).</a:t>
-            </a:r>
-          </a:p>
-          <a:p>
-            <a:r>
-              <a:rPr lang="en-US" dirty="0"/>
-              <a:t>Before ES6, JavaScript used prototype-based inheritance rather than classical inheritance found in languages like Java or C++. Prototypal inheritance can be less intuitive and verbose for those coming from classical inheritance backgrounds.</a:t>
-            </a:r>
-          </a:p>
-          <a:p>
-            <a:r>
-              <a:rPr lang="en-US" dirty="0"/>
-              <a:t>Classes in ES6 provide a more familiar syntax for defining object-oriented programming (OOP) constructs like constructors, methods, and inheritance, similar to other object-oriented programming languages.</a:t>
-            </a:r>
           </a:p>
           <a:p>
             <a:pPr marL="0" indent="0">

</xml_diff>